<commit_message>
Not diagnostics, just addition of image to presentation
</commit_message>
<xml_diff>
--- a/Presentation.pptx
+++ b/Presentation.pptx
@@ -129,6 +129,10 @@
 </p:presentation>
 </file>
 
+<file path=ppt/revisionInfo.xml><?xml version="1.0" encoding="utf-8"?>
+<p1510:revInfo xmlns:a="http://schemas.openxmlformats.org/drawingml/2006/main" xmlns:r="http://schemas.openxmlformats.org/officeDocument/2006/relationships" xmlns:p1510="http://schemas.microsoft.com/office/powerpoint/2015/10/main"/>
+</file>
+
 <file path=ppt/slideLayouts/slideLayout1.xml><?xml version="1.0" encoding="utf-8"?>
 <p:sldLayout xmlns:a="http://schemas.openxmlformats.org/drawingml/2006/main" xmlns:r="http://schemas.openxmlformats.org/officeDocument/2006/relationships" xmlns:p="http://schemas.openxmlformats.org/presentationml/2006/main" type="title" preserve="1">
   <p:cSld name="Title Slide">
@@ -403,7 +407,7 @@
           <a:p>
             <a:fld id="{78ABE3C1-DBE1-495D-B57B-2849774B866A}" type="datetimeFigureOut">
               <a:rPr lang="en-US" dirty="0"/>
-              <a:t>5/1/2017</a:t>
+              <a:t>5/3/2017</a:t>
             </a:fld>
             <a:endParaRPr lang="en-US" dirty="0"/>
           </a:p>
@@ -812,7 +816,7 @@
           <a:p>
             <a:fld id="{446C117F-5CCF-4837-BE5F-2B92066CAFAF}" type="datetimeFigureOut">
               <a:rPr lang="en-US" dirty="0"/>
-              <a:t>5/1/2017</a:t>
+              <a:t>5/3/2017</a:t>
             </a:fld>
             <a:endParaRPr lang="en-US" dirty="0"/>
           </a:p>
@@ -1143,7 +1147,7 @@
           <a:p>
             <a:fld id="{84EB90BD-B6CE-46B7-997F-7313B992CCDC}" type="datetimeFigureOut">
               <a:rPr lang="en-US" dirty="0"/>
-              <a:t>5/1/2017</a:t>
+              <a:t>5/3/2017</a:t>
             </a:fld>
             <a:endParaRPr lang="en-US" dirty="0"/>
           </a:p>
@@ -1543,7 +1547,7 @@
           <a:p>
             <a:fld id="{CDB9D11F-B188-461D-B23F-39381795C052}" type="datetimeFigureOut">
               <a:rPr lang="en-US" dirty="0"/>
-              <a:t>5/1/2017</a:t>
+              <a:t>5/3/2017</a:t>
             </a:fld>
             <a:endParaRPr lang="en-US" dirty="0"/>
           </a:p>
@@ -2106,7 +2110,7 @@
           <a:p>
             <a:fld id="{52E6D8D9-55A2-4063-B0F3-121F44549695}" type="datetimeFigureOut">
               <a:rPr lang="en-US" dirty="0"/>
-              <a:t>5/1/2017</a:t>
+              <a:t>5/3/2017</a:t>
             </a:fld>
             <a:endParaRPr lang="en-US" dirty="0"/>
           </a:p>
@@ -2782,7 +2786,7 @@
           <a:p>
             <a:fld id="{D4B24536-994D-4021-A283-9F449C0DB509}" type="datetimeFigureOut">
               <a:rPr lang="en-US" dirty="0"/>
-              <a:t>5/1/2017</a:t>
+              <a:t>5/3/2017</a:t>
             </a:fld>
             <a:endParaRPr lang="en-US" dirty="0"/>
           </a:p>
@@ -3690,7 +3694,7 @@
           <a:p>
             <a:fld id="{3CBBBB78-C96F-47B7-AB17-D852CA960AC9}" type="datetimeFigureOut">
               <a:rPr lang="en-US" dirty="0"/>
-              <a:t>5/1/2017</a:t>
+              <a:t>5/3/2017</a:t>
             </a:fld>
             <a:endParaRPr lang="en-US" dirty="0"/>
           </a:p>
@@ -3998,7 +4002,7 @@
           <a:p>
             <a:fld id="{1FA3F48C-C7C6-4055-9F49-3777875E72AE}" type="datetimeFigureOut">
               <a:rPr lang="en-US" dirty="0"/>
-              <a:t>5/1/2017</a:t>
+              <a:t>5/3/2017</a:t>
             </a:fld>
             <a:endParaRPr lang="en-US" dirty="0"/>
           </a:p>
@@ -4257,7 +4261,7 @@
           <a:p>
             <a:fld id="{6178E61D-D431-422C-9764-11DAFE33AB63}" type="datetimeFigureOut">
               <a:rPr lang="en-US" dirty="0"/>
-              <a:t>5/1/2017</a:t>
+              <a:t>5/3/2017</a:t>
             </a:fld>
             <a:endParaRPr lang="en-US" dirty="0"/>
           </a:p>
@@ -4576,7 +4580,7 @@
           <a:p>
             <a:fld id="{12DE42F4-6EEF-4EF7-8ED4-2208F0F89A08}" type="datetimeFigureOut">
               <a:rPr lang="en-US" dirty="0"/>
-              <a:t>5/1/2017</a:t>
+              <a:t>5/3/2017</a:t>
             </a:fld>
             <a:endParaRPr lang="en-US" dirty="0"/>
           </a:p>
@@ -4960,7 +4964,7 @@
           <a:p>
             <a:fld id="{30578ACC-22D6-47C1-A373-4FD133E34F3C}" type="datetimeFigureOut">
               <a:rPr lang="en-US" dirty="0"/>
-              <a:t>5/1/2017</a:t>
+              <a:t>5/3/2017</a:t>
             </a:fld>
             <a:endParaRPr lang="en-US" dirty="0"/>
           </a:p>
@@ -5331,7 +5335,7 @@
           <a:p>
             <a:fld id="{4E5A6C69-6797-4E8A-BF37-F2C3751466E9}" type="datetimeFigureOut">
               <a:rPr lang="en-US" dirty="0"/>
-              <a:t>5/1/2017</a:t>
+              <a:t>5/3/2017</a:t>
             </a:fld>
             <a:endParaRPr lang="en-US" dirty="0"/>
           </a:p>
@@ -5832,7 +5836,7 @@
           <a:p>
             <a:fld id="{D82014A1-A632-4878-A0D3-F52BA7563730}" type="datetimeFigureOut">
               <a:rPr lang="en-US" dirty="0"/>
-              <a:t>5/1/2017</a:t>
+              <a:t>5/3/2017</a:t>
             </a:fld>
             <a:endParaRPr lang="en-US" dirty="0"/>
           </a:p>
@@ -6084,7 +6088,7 @@
           <a:p>
             <a:fld id="{CE99F462-093F-4566-844B-4C71F2739DA5}" type="datetimeFigureOut">
               <a:rPr lang="en-US" dirty="0"/>
-              <a:t>5/1/2017</a:t>
+              <a:t>5/3/2017</a:t>
             </a:fld>
             <a:endParaRPr lang="en-US" dirty="0"/>
           </a:p>
@@ -6242,7 +6246,7 @@
           <a:p>
             <a:fld id="{3D24A7AC-904D-4781-85BA-7D10C17ED021}" type="datetimeFigureOut">
               <a:rPr lang="en-US" dirty="0"/>
-              <a:t>5/1/2017</a:t>
+              <a:t>5/3/2017</a:t>
             </a:fld>
             <a:endParaRPr lang="en-US" dirty="0"/>
           </a:p>
@@ -6627,7 +6631,7 @@
           <a:p>
             <a:fld id="{E331444B-B92B-4E27-8C94-BB93EAF5CB18}" type="datetimeFigureOut">
               <a:rPr lang="en-US" dirty="0"/>
-              <a:t>5/1/2017</a:t>
+              <a:t>5/3/2017</a:t>
             </a:fld>
             <a:endParaRPr lang="en-US" dirty="0"/>
           </a:p>
@@ -7031,7 +7035,7 @@
           <a:p>
             <a:fld id="{363EFA5E-FA76-400D-B3DC-F0BA90E6D107}" type="datetimeFigureOut">
               <a:rPr lang="en-US" dirty="0"/>
-              <a:t>5/1/2017</a:t>
+              <a:t>5/3/2017</a:t>
             </a:fld>
             <a:endParaRPr lang="en-US" dirty="0"/>
           </a:p>
@@ -7270,7 +7274,7 @@
           <a:p>
             <a:fld id="{9D6E9DEC-419B-4CC5-A080-3B06BD5A8291}" type="datetimeFigureOut">
               <a:rPr lang="en-US" dirty="0"/>
-              <a:t>5/1/2017</a:t>
+              <a:t>5/3/2017</a:t>
             </a:fld>
             <a:endParaRPr lang="en-US" dirty="0"/>
           </a:p>
@@ -8863,6 +8867,30 @@
           </a:p>
         </p:txBody>
       </p:sp>
+      <p:pic>
+        <p:nvPicPr>
+          <p:cNvPr id="4" name="Picture 3"/>
+          <p:cNvPicPr>
+            <a:picLocks noChangeAspect="1"/>
+          </p:cNvPicPr>
+          <p:nvPr/>
+        </p:nvPicPr>
+        <p:blipFill>
+          <a:blip r:embed="rId2"/>
+          <a:stretch>
+            <a:fillRect/>
+          </a:stretch>
+        </p:blipFill>
+        <p:spPr>
+          <a:xfrm>
+            <a:off x="7964561" y="4813116"/>
+            <a:ext cx="3848974" cy="1785269"/>
+          </a:xfrm>
+          <a:prstGeom prst="rect">
+            <a:avLst/>
+          </a:prstGeom>
+        </p:spPr>
+      </p:pic>
     </p:spTree>
     <p:extLst>
       <p:ext uri="{BB962C8B-B14F-4D97-AF65-F5344CB8AC3E}">

</xml_diff>